<commit_message>
Deleted the data files not used and, just kept the Final_data folder
</commit_message>
<xml_diff>
--- a/Project_3_proposal.pptx
+++ b/Project_3_proposal.pptx
@@ -6,12 +6,13 @@
     <p:sldMasterId id="2147483653" r:id="rId2"/>
   </p:sldMasterIdLst>
   <p:notesMasterIdLst>
-    <p:notesMasterId r:id="rId6"/>
+    <p:notesMasterId r:id="rId7"/>
   </p:notesMasterIdLst>
   <p:sldIdLst>
     <p:sldId id="256" r:id="rId3"/>
     <p:sldId id="257" r:id="rId4"/>
     <p:sldId id="258" r:id="rId5"/>
+    <p:sldId id="259" r:id="rId6"/>
   </p:sldIdLst>
   <p:sldSz cx="12192000" cy="6858000"/>
   <p:notesSz cx="7010400" cy="9296400"/>
@@ -260,7 +261,7 @@
       </p15:sldGuideLst>
     </p:ext>
     <p:ext uri="http://customooxmlschemas.google.com/">
-      <go:slidesCustomData xmlns:go="http://customooxmlschemas.google.com/" xmlns:ahyp="http://schemas.microsoft.com/office/drawing/2018/hyperlinkcolor" xmlns:p15="http://schemas.microsoft.com/office/powerpoint/2012/main" xmlns:p14="http://schemas.microsoft.com/office/powerpoint/2010/main" xmlns:com="http://schemas.openxmlformats.org/drawingml/2006/compatibility" xmlns:pvml="urn:schemas-microsoft-com:office:powerpoint" xmlns:v="urn:schemas-microsoft-com:vml" xmlns:o="urn:schemas-microsoft-com:office:office" xmlns:dgm="http://schemas.openxmlformats.org/drawingml/2006/diagram" xmlns:c="http://schemas.openxmlformats.org/drawingml/2006/chart" xmlns:mv="urn:schemas-microsoft-com:mac:vml" xmlns:mc="http://schemas.openxmlformats.org/markup-compatibility/2006" xmlns="" r:id="rId14" roundtripDataSignature="AMtx7mjvjJkRmz/bigK8rfaOhcAWgBtoAw=="/>
+      <go:slidesCustomData xmlns="" xmlns:mc="http://schemas.openxmlformats.org/markup-compatibility/2006" xmlns:mv="urn:schemas-microsoft-com:mac:vml" xmlns:c="http://schemas.openxmlformats.org/drawingml/2006/chart" xmlns:dgm="http://schemas.openxmlformats.org/drawingml/2006/diagram" xmlns:o="urn:schemas-microsoft-com:office:office" xmlns:v="urn:schemas-microsoft-com:vml" xmlns:pvml="urn:schemas-microsoft-com:office:powerpoint" xmlns:com="http://schemas.openxmlformats.org/drawingml/2006/compatibility" xmlns:p14="http://schemas.microsoft.com/office/powerpoint/2010/main" xmlns:p15="http://schemas.microsoft.com/office/powerpoint/2012/main" xmlns:ahyp="http://schemas.microsoft.com/office/drawing/2018/hyperlinkcolor" xmlns:go="http://customooxmlschemas.google.com/" r:id="rId14" roundtripDataSignature="AMtx7mjvjJkRmz/bigK8rfaOhcAWgBtoAw=="/>
     </p:ext>
   </p:extLst>
 </p:presentation>
@@ -1824,6 +1825,115 @@
         </p:spPr>
       </p:sp>
     </p:spTree>
+  </p:cSld>
+  <p:clrMapOvr>
+    <a:masterClrMapping/>
+  </p:clrMapOvr>
+</p:notes>
+</file>
+
+<file path=ppt/notesSlides/notesSlide4.xml><?xml version="1.0" encoding="utf-8"?>
+<p:notes xmlns:a="http://schemas.openxmlformats.org/drawingml/2006/main" xmlns:r="http://schemas.openxmlformats.org/officeDocument/2006/relationships" xmlns:p="http://schemas.openxmlformats.org/presentationml/2006/main" showMasterSp="0" showMasterPhAnim="0">
+  <p:cSld>
+    <p:spTree>
+      <p:nvGrpSpPr>
+        <p:cNvPr id="1" name="Shape 90"/>
+        <p:cNvGrpSpPr/>
+        <p:nvPr/>
+      </p:nvGrpSpPr>
+      <p:grpSpPr>
+        <a:xfrm>
+          <a:off x="0" y="0"/>
+          <a:ext cx="0" cy="0"/>
+          <a:chOff x="0" y="0"/>
+          <a:chExt cx="0" cy="0"/>
+        </a:xfrm>
+      </p:grpSpPr>
+      <p:sp>
+        <p:nvSpPr>
+          <p:cNvPr id="91" name="Google Shape;91;gfb9413f75f_2_28:notes"/>
+          <p:cNvSpPr txBox="1">
+            <a:spLocks noGrp="1"/>
+          </p:cNvSpPr>
+          <p:nvPr>
+            <p:ph type="body" idx="1"/>
+          </p:nvPr>
+        </p:nvSpPr>
+        <p:spPr>
+          <a:xfrm>
+            <a:off x="701675" y="4473575"/>
+            <a:ext cx="5607050" cy="3660775"/>
+          </a:xfrm>
+          <a:prstGeom prst="rect">
+            <a:avLst/>
+          </a:prstGeom>
+        </p:spPr>
+        <p:txBody>
+          <a:bodyPr spcFirstLastPara="1" wrap="square" lIns="91425" tIns="45700" rIns="91425" bIns="45700" anchor="t" anchorCtr="0">
+            <a:noAutofit/>
+          </a:bodyPr>
+          <a:lstStyle/>
+          <a:p>
+            <a:pPr marL="0" lvl="0" indent="0" algn="l" rtl="0">
+              <a:spcBef>
+                <a:spcPts val="0"/>
+              </a:spcBef>
+              <a:spcAft>
+                <a:spcPts val="0"/>
+              </a:spcAft>
+              <a:buNone/>
+            </a:pPr>
+            <a:endParaRPr/>
+          </a:p>
+        </p:txBody>
+      </p:sp>
+      <p:sp>
+        <p:nvSpPr>
+          <p:cNvPr id="92" name="Google Shape;92;gfb9413f75f_2_28:notes"/>
+          <p:cNvSpPr>
+            <a:spLocks noGrp="1" noRot="1" noChangeAspect="1"/>
+          </p:cNvSpPr>
+          <p:nvPr>
+            <p:ph type="sldImg" idx="2"/>
+          </p:nvPr>
+        </p:nvSpPr>
+        <p:spPr>
+          <a:xfrm>
+            <a:off x="717550" y="1162050"/>
+            <a:ext cx="5575300" cy="3136900"/>
+          </a:xfrm>
+          <a:custGeom>
+            <a:avLst/>
+            <a:gdLst/>
+            <a:ahLst/>
+            <a:cxnLst/>
+            <a:rect l="l" t="t" r="r" b="b"/>
+            <a:pathLst>
+              <a:path w="120000" h="120000" extrusionOk="0">
+                <a:moveTo>
+                  <a:pt x="0" y="0"/>
+                </a:moveTo>
+                <a:lnTo>
+                  <a:pt x="120000" y="0"/>
+                </a:lnTo>
+                <a:lnTo>
+                  <a:pt x="120000" y="120000"/>
+                </a:lnTo>
+                <a:lnTo>
+                  <a:pt x="0" y="120000"/>
+                </a:lnTo>
+                <a:close/>
+              </a:path>
+            </a:pathLst>
+          </a:custGeom>
+        </p:spPr>
+      </p:sp>
+    </p:spTree>
+    <p:extLst>
+      <p:ext uri="{BB962C8B-B14F-4D97-AF65-F5344CB8AC3E}">
+        <p14:creationId xmlns:p14="http://schemas.microsoft.com/office/powerpoint/2010/main" val="3000835008"/>
+      </p:ext>
+    </p:extLst>
   </p:cSld>
   <p:clrMapOvr>
     <a:masterClrMapping/>
@@ -11244,6 +11354,128 @@
         </p:txBody>
       </p:sp>
     </p:spTree>
+  </p:cSld>
+  <p:clrMapOvr>
+    <a:masterClrMapping/>
+  </p:clrMapOvr>
+</p:sld>
+</file>
+
+<file path=ppt/slides/slide4.xml><?xml version="1.0" encoding="utf-8"?>
+<p:sld xmlns:a="http://schemas.openxmlformats.org/drawingml/2006/main" xmlns:r="http://schemas.openxmlformats.org/officeDocument/2006/relationships" xmlns:p="http://schemas.openxmlformats.org/presentationml/2006/main">
+  <p:cSld>
+    <p:spTree>
+      <p:nvGrpSpPr>
+        <p:cNvPr id="1" name="Shape 93"/>
+        <p:cNvGrpSpPr/>
+        <p:nvPr/>
+      </p:nvGrpSpPr>
+      <p:grpSpPr>
+        <a:xfrm>
+          <a:off x="0" y="0"/>
+          <a:ext cx="0" cy="0"/>
+          <a:chOff x="0" y="0"/>
+          <a:chExt cx="0" cy="0"/>
+        </a:xfrm>
+      </p:grpSpPr>
+      <p:sp>
+        <p:nvSpPr>
+          <p:cNvPr id="94" name="Google Shape;94;gfb9413f75f_2_28"/>
+          <p:cNvSpPr txBox="1"/>
+          <p:nvPr/>
+        </p:nvSpPr>
+        <p:spPr>
+          <a:xfrm>
+            <a:off x="559837" y="72737"/>
+            <a:ext cx="11140931" cy="768927"/>
+          </a:xfrm>
+          <a:prstGeom prst="rect">
+            <a:avLst/>
+          </a:prstGeom>
+          <a:noFill/>
+          <a:ln>
+            <a:noFill/>
+          </a:ln>
+        </p:spPr>
+        <p:txBody>
+          <a:bodyPr spcFirstLastPara="1" wrap="square" lIns="91425" tIns="45700" rIns="91425" bIns="45700" anchor="ctr" anchorCtr="0">
+            <a:normAutofit/>
+          </a:bodyPr>
+          <a:lstStyle/>
+          <a:p>
+            <a:pPr marL="0" marR="0" lvl="0" indent="0" algn="l" rtl="0">
+              <a:lnSpc>
+                <a:spcPct val="90000"/>
+              </a:lnSpc>
+              <a:spcBef>
+                <a:spcPts val="0"/>
+              </a:spcBef>
+              <a:spcAft>
+                <a:spcPts val="0"/>
+              </a:spcAft>
+              <a:buClr>
+                <a:schemeClr val="dk1"/>
+              </a:buClr>
+              <a:buSzPts val="4000"/>
+              <a:buFont typeface="Calibri"/>
+              <a:buNone/>
+            </a:pPr>
+            <a:r>
+              <a:rPr lang="en-US" sz="4000" b="1" dirty="0">
+                <a:solidFill>
+                  <a:srgbClr val="0070C0"/>
+                </a:solidFill>
+                <a:latin typeface="Calibri"/>
+                <a:ea typeface="Calibri"/>
+                <a:cs typeface="Calibri"/>
+                <a:sym typeface="Calibri"/>
+              </a:rPr>
+              <a:t>High Level Architecture</a:t>
+            </a:r>
+            <a:endParaRPr dirty="0">
+              <a:solidFill>
+                <a:srgbClr val="0070C0"/>
+              </a:solidFill>
+            </a:endParaRPr>
+          </a:p>
+        </p:txBody>
+      </p:sp>
+      <p:pic>
+        <p:nvPicPr>
+          <p:cNvPr id="2" name="Picture 1">
+            <a:extLst>
+              <a:ext uri="{FF2B5EF4-FFF2-40B4-BE49-F238E27FC236}">
+                <a16:creationId xmlns:a16="http://schemas.microsoft.com/office/drawing/2014/main" id="{8F1F4717-6D82-A94A-9237-5AF55F6ED6B9}"/>
+              </a:ext>
+            </a:extLst>
+          </p:cNvPr>
+          <p:cNvPicPr>
+            <a:picLocks noChangeAspect="1"/>
+          </p:cNvPicPr>
+          <p:nvPr/>
+        </p:nvPicPr>
+        <p:blipFill>
+          <a:blip r:embed="rId3"/>
+          <a:stretch>
+            <a:fillRect/>
+          </a:stretch>
+        </p:blipFill>
+        <p:spPr>
+          <a:xfrm>
+            <a:off x="433858" y="841664"/>
+            <a:ext cx="6469839" cy="5200057"/>
+          </a:xfrm>
+          <a:prstGeom prst="rect">
+            <a:avLst/>
+          </a:prstGeom>
+        </p:spPr>
+      </p:pic>
+    </p:spTree>
+    <p:extLst>
+      <p:ext uri="{BB962C8B-B14F-4D97-AF65-F5344CB8AC3E}">
+        <p14:creationId xmlns:p14="http://schemas.microsoft.com/office/powerpoint/2010/main" val="2276083152"/>
+      </p:ext>
+    </p:extLst>
   </p:cSld>
   <p:clrMapOvr>
     <a:masterClrMapping/>

</xml_diff>